<commit_message>
update lec 7 and notes
</commit_message>
<xml_diff>
--- a/lectures/mikro/Forelesning7.pptx
+++ b/lectures/mikro/Forelesning7.pptx
@@ -2513,13 +2513,8 @@
           <a:p>
             <a:r>
               <a:rPr lang="nb-NO" dirty="0"/>
-              <a:t>Hva kjennetegner offentlige </a:t>
-            </a:r>
-            <a:r>
-              <a:rPr lang="nb-NO" dirty="0" err="1"/>
-              <a:t>virksomhter</a:t>
-            </a:r>
-            <a:endParaRPr lang="nb-NO" dirty="0"/>
+              <a:t>Hva kjennetegner offentlige virksomheter</a:t>
+            </a:r>
           </a:p>
         </p:txBody>
       </p:sp>
@@ -2565,15 +2560,7 @@
           <a:p>
             <a:r>
               <a:rPr lang="nb-NO" dirty="0"/>
-              <a:t>Må prioritere svært ulike oppgaver uten en tydelig </a:t>
-            </a:r>
-            <a:r>
-              <a:rPr lang="nb-NO" dirty="0" err="1"/>
-              <a:t>prismekansime</a:t>
-            </a:r>
-            <a:r>
-              <a:rPr lang="nb-NO" dirty="0"/>
-              <a:t> som hjelp til styring </a:t>
+              <a:t>Må prioritere svært ulike oppgaver uten en tydelig prismekanisme som hjelp til styring </a:t>
             </a:r>
           </a:p>
           <a:p>
@@ -2905,8 +2892,8 @@
           </a:p>
         </p:txBody>
       </p:sp>
-      <mc:AlternateContent xmlns:mc="http://schemas.openxmlformats.org/markup-compatibility/2006" xmlns:a14="http://schemas.microsoft.com/office/drawing/2010/main">
-        <mc:Choice Requires="a14">
+      <mc:AlternateContent xmlns:mc="http://schemas.openxmlformats.org/markup-compatibility/2006">
+        <mc:Choice xmlns:a14="http://schemas.microsoft.com/office/drawing/2010/main" Requires="a14">
           <p:sp>
             <p:nvSpPr>
               <p:cNvPr id="3" name="Plassholder for innhold 2">
@@ -3394,6 +3381,14 @@
                 <a:pPr marL="0" indent="0">
                   <a:buNone/>
                 </a:pPr>
+                <a:endParaRPr lang="nb-NO" b="0" i="1" dirty="0">
+                  <a:latin typeface="Cambria Math" panose="02040503050406030204" pitchFamily="18" charset="0"/>
+                </a:endParaRPr>
+              </a:p>
+              <a:p>
+                <a:pPr marL="0" indent="0">
+                  <a:buNone/>
+                </a:pPr>
                 <a14:m>
                   <m:oMathPara xmlns:m="http://schemas.openxmlformats.org/officeDocument/2006/math">
                     <m:oMathParaPr>
@@ -3536,6 +3531,14 @@
                 <a:pPr marL="0" indent="0">
                   <a:buNone/>
                 </a:pPr>
+                <a:endParaRPr lang="nb-NO" b="0" i="1" dirty="0">
+                  <a:latin typeface="Cambria Math" panose="02040503050406030204" pitchFamily="18" charset="0"/>
+                </a:endParaRPr>
+              </a:p>
+              <a:p>
+                <a:pPr marL="0" indent="0">
+                  <a:buNone/>
+                </a:pPr>
                 <a14:m>
                   <m:oMathPara xmlns:m="http://schemas.openxmlformats.org/officeDocument/2006/math">
                     <m:oMathParaPr>
@@ -3636,7 +3639,13 @@
                         <a:rPr lang="nb-NO" b="0" i="1" smtClean="0">
                           <a:latin typeface="Cambria Math" panose="02040503050406030204" pitchFamily="18" charset="0"/>
                         </a:rPr>
-                        <m:t>&gt;20</m:t>
+                        <m:t>&lt;</m:t>
+                      </m:r>
+                      <m:r>
+                        <a:rPr lang="nb-NO" b="0" i="1" smtClean="0">
+                          <a:latin typeface="Cambria Math" panose="02040503050406030204" pitchFamily="18" charset="0"/>
+                        </a:rPr>
+                        <m:t>20</m:t>
                       </m:r>
                     </m:oMath>
                   </m:oMathPara>
@@ -3730,7 +3739,7 @@
             </p:txBody>
           </p:sp>
         </mc:Choice>
-        <mc:Fallback xmlns="">
+        <mc:Fallback>
           <p:sp>
             <p:nvSpPr>
               <p:cNvPr id="3" name="Plassholder for innhold 2">
@@ -3751,7 +3760,7 @@
               <a:blipFill>
                 <a:blip r:embed="rId2"/>
                 <a:stretch>
-                  <a:fillRect l="-724"/>
+                  <a:fillRect l="-724" b="-2180"/>
                 </a:stretch>
               </a:blipFill>
             </p:spPr>
@@ -3828,8 +3837,8 @@
           </a:p>
         </p:txBody>
       </p:sp>
-      <mc:AlternateContent xmlns:mc="http://schemas.openxmlformats.org/markup-compatibility/2006">
-        <mc:Choice xmlns:a14="http://schemas.microsoft.com/office/drawing/2010/main" Requires="a14">
+      <mc:AlternateContent xmlns:mc="http://schemas.openxmlformats.org/markup-compatibility/2006" xmlns:a14="http://schemas.microsoft.com/office/drawing/2010/main">
+        <mc:Choice Requires="a14">
           <p:sp>
             <p:nvSpPr>
               <p:cNvPr id="3" name="Plassholder for innhold 2">
@@ -4045,7 +4054,7 @@
             </p:txBody>
           </p:sp>
         </mc:Choice>
-        <mc:Fallback>
+        <mc:Fallback xmlns="">
           <p:sp>
             <p:nvSpPr>
               <p:cNvPr id="3" name="Plassholder for innhold 2">
@@ -6554,8 +6563,8 @@
           </a:p>
         </p:txBody>
       </p:sp>
-      <mc:AlternateContent xmlns:mc="http://schemas.openxmlformats.org/markup-compatibility/2006">
-        <mc:Choice xmlns:a14="http://schemas.microsoft.com/office/drawing/2010/main" Requires="a14">
+      <mc:AlternateContent xmlns:mc="http://schemas.openxmlformats.org/markup-compatibility/2006" xmlns:a14="http://schemas.microsoft.com/office/drawing/2010/main">
+        <mc:Choice Requires="a14">
           <p:sp>
             <p:nvSpPr>
               <p:cNvPr id="3" name="Plassholder for innhold 2">
@@ -6893,13 +6902,25 @@
                       <a:rPr lang="nb-NO" b="0" i="1" smtClean="0">
                         <a:latin typeface="Cambria Math" panose="02040503050406030204" pitchFamily="18" charset="0"/>
                       </a:rPr>
-                      <m:t>𝛼</m:t>
+                      <m:t>𝑊</m:t>
                     </m:r>
                     <m:r>
                       <a:rPr lang="nb-NO" b="0" i="1" smtClean="0">
                         <a:latin typeface="Cambria Math" panose="02040503050406030204" pitchFamily="18" charset="0"/>
                       </a:rPr>
-                      <m:t>=0</m:t>
+                      <m:t>′(</m:t>
+                    </m:r>
+                    <m:r>
+                      <a:rPr lang="nb-NO" b="0" i="1" smtClean="0">
+                        <a:latin typeface="Cambria Math" panose="02040503050406030204" pitchFamily="18" charset="0"/>
+                      </a:rPr>
+                      <m:t>𝑥</m:t>
+                    </m:r>
+                    <m:r>
+                      <a:rPr lang="nb-NO" b="0" i="1" smtClean="0">
+                        <a:latin typeface="Cambria Math" panose="02040503050406030204" pitchFamily="18" charset="0"/>
+                      </a:rPr>
+                      <m:t>)=0</m:t>
                     </m:r>
                   </m:oMath>
                 </a14:m>
@@ -7070,7 +7091,7 @@
             </p:txBody>
           </p:sp>
         </mc:Choice>
-        <mc:Fallback>
+        <mc:Fallback xmlns="">
           <p:sp>
             <p:nvSpPr>
               <p:cNvPr id="3" name="Plassholder for innhold 2">
@@ -8668,7 +8689,10 @@
           <a:bodyPr/>
           <a:lstStyle/>
           <a:p>
-            <a:endParaRPr lang="nb-NO"/>
+            <a:r>
+              <a:rPr lang="nb-NO" dirty="0"/>
+              <a:t>Offentlig sektor i Norge</a:t>
+            </a:r>
           </a:p>
         </p:txBody>
       </p:sp>
@@ -8701,36 +8725,6 @@
           </a:xfrm>
         </p:spPr>
       </p:pic>
-      <p:sp>
-        <p:nvSpPr>
-          <p:cNvPr id="6" name="Plassholder for innhold 5">
-            <a:extLst>
-              <a:ext uri="{FF2B5EF4-FFF2-40B4-BE49-F238E27FC236}">
-                <a16:creationId xmlns:a16="http://schemas.microsoft.com/office/drawing/2014/main" id="{A0103D6C-ABD8-41ED-94FF-F371C6ADF535}"/>
-              </a:ext>
-            </a:extLst>
-          </p:cNvPr>
-          <p:cNvSpPr>
-            <a:spLocks noGrp="1"/>
-          </p:cNvSpPr>
-          <p:nvPr>
-            <p:ph sz="half" idx="11"/>
-          </p:nvPr>
-        </p:nvSpPr>
-        <p:spPr>
-          <a:xfrm>
-            <a:off x="9063889" y="1351722"/>
-            <a:ext cx="2504223" cy="4439479"/>
-          </a:xfrm>
-        </p:spPr>
-        <p:txBody>
-          <a:bodyPr/>
-          <a:lstStyle/>
-          <a:p>
-            <a:endParaRPr lang="nb-NO" dirty="0"/>
-          </a:p>
-        </p:txBody>
-      </p:sp>
       <p:pic>
         <p:nvPicPr>
           <p:cNvPr id="8" name="Bilde 7">
@@ -8791,31 +8785,6 @@
           <a:chExt cx="0" cy="0"/>
         </a:xfrm>
       </p:grpSpPr>
-      <p:sp>
-        <p:nvSpPr>
-          <p:cNvPr id="2" name="Tittel 1">
-            <a:extLst>
-              <a:ext uri="{FF2B5EF4-FFF2-40B4-BE49-F238E27FC236}">
-                <a16:creationId xmlns:a16="http://schemas.microsoft.com/office/drawing/2014/main" id="{5F17DC4C-CE2E-4895-9960-9E0731DD473E}"/>
-              </a:ext>
-            </a:extLst>
-          </p:cNvPr>
-          <p:cNvSpPr>
-            <a:spLocks noGrp="1"/>
-          </p:cNvSpPr>
-          <p:nvPr>
-            <p:ph type="title"/>
-          </p:nvPr>
-        </p:nvSpPr>
-        <p:spPr/>
-        <p:txBody>
-          <a:bodyPr/>
-          <a:lstStyle/>
-          <a:p>
-            <a:endParaRPr lang="nb-NO"/>
-          </a:p>
-        </p:txBody>
-      </p:sp>
       <p:sp>
         <p:nvSpPr>
           <p:cNvPr id="3" name="Plassholder for innhold 2">

</xml_diff>